<commit_message>
final typos and additions finished
</commit_message>
<xml_diff>
--- a/fig/workflow.pptx
+++ b/fig/workflow.pptx
@@ -262,7 +262,7 @@
           <a:p>
             <a:fld id="{62E3D18E-7E1A-4440-A226-D2B0979B45F4}" type="datetimeFigureOut">
               <a:rPr lang="en-KE" smtClean="0"/>
-              <a:t>11/8/20</a:t>
+              <a:t>11/9/20</a:t>
             </a:fld>
             <a:endParaRPr lang="en-KE"/>
           </a:p>
@@ -462,7 +462,7 @@
           <a:p>
             <a:fld id="{62E3D18E-7E1A-4440-A226-D2B0979B45F4}" type="datetimeFigureOut">
               <a:rPr lang="en-KE" smtClean="0"/>
-              <a:t>11/8/20</a:t>
+              <a:t>11/9/20</a:t>
             </a:fld>
             <a:endParaRPr lang="en-KE"/>
           </a:p>
@@ -672,7 +672,7 @@
           <a:p>
             <a:fld id="{62E3D18E-7E1A-4440-A226-D2B0979B45F4}" type="datetimeFigureOut">
               <a:rPr lang="en-KE" smtClean="0"/>
-              <a:t>11/8/20</a:t>
+              <a:t>11/9/20</a:t>
             </a:fld>
             <a:endParaRPr lang="en-KE"/>
           </a:p>
@@ -872,7 +872,7 @@
           <a:p>
             <a:fld id="{62E3D18E-7E1A-4440-A226-D2B0979B45F4}" type="datetimeFigureOut">
               <a:rPr lang="en-KE" smtClean="0"/>
-              <a:t>11/8/20</a:t>
+              <a:t>11/9/20</a:t>
             </a:fld>
             <a:endParaRPr lang="en-KE"/>
           </a:p>
@@ -1148,7 +1148,7 @@
           <a:p>
             <a:fld id="{62E3D18E-7E1A-4440-A226-D2B0979B45F4}" type="datetimeFigureOut">
               <a:rPr lang="en-KE" smtClean="0"/>
-              <a:t>11/8/20</a:t>
+              <a:t>11/9/20</a:t>
             </a:fld>
             <a:endParaRPr lang="en-KE"/>
           </a:p>
@@ -1416,7 +1416,7 @@
           <a:p>
             <a:fld id="{62E3D18E-7E1A-4440-A226-D2B0979B45F4}" type="datetimeFigureOut">
               <a:rPr lang="en-KE" smtClean="0"/>
-              <a:t>11/8/20</a:t>
+              <a:t>11/9/20</a:t>
             </a:fld>
             <a:endParaRPr lang="en-KE"/>
           </a:p>
@@ -1831,7 +1831,7 @@
           <a:p>
             <a:fld id="{62E3D18E-7E1A-4440-A226-D2B0979B45F4}" type="datetimeFigureOut">
               <a:rPr lang="en-KE" smtClean="0"/>
-              <a:t>11/8/20</a:t>
+              <a:t>11/9/20</a:t>
             </a:fld>
             <a:endParaRPr lang="en-KE"/>
           </a:p>
@@ -1973,7 +1973,7 @@
           <a:p>
             <a:fld id="{62E3D18E-7E1A-4440-A226-D2B0979B45F4}" type="datetimeFigureOut">
               <a:rPr lang="en-KE" smtClean="0"/>
-              <a:t>11/8/20</a:t>
+              <a:t>11/9/20</a:t>
             </a:fld>
             <a:endParaRPr lang="en-KE"/>
           </a:p>
@@ -2086,7 +2086,7 @@
           <a:p>
             <a:fld id="{62E3D18E-7E1A-4440-A226-D2B0979B45F4}" type="datetimeFigureOut">
               <a:rPr lang="en-KE" smtClean="0"/>
-              <a:t>11/8/20</a:t>
+              <a:t>11/9/20</a:t>
             </a:fld>
             <a:endParaRPr lang="en-KE"/>
           </a:p>
@@ -2399,7 +2399,7 @@
           <a:p>
             <a:fld id="{62E3D18E-7E1A-4440-A226-D2B0979B45F4}" type="datetimeFigureOut">
               <a:rPr lang="en-KE" smtClean="0"/>
-              <a:t>11/8/20</a:t>
+              <a:t>11/9/20</a:t>
             </a:fld>
             <a:endParaRPr lang="en-KE"/>
           </a:p>
@@ -2688,7 +2688,7 @@
           <a:p>
             <a:fld id="{62E3D18E-7E1A-4440-A226-D2B0979B45F4}" type="datetimeFigureOut">
               <a:rPr lang="en-KE" smtClean="0"/>
-              <a:t>11/8/20</a:t>
+              <a:t>11/9/20</a:t>
             </a:fld>
             <a:endParaRPr lang="en-KE"/>
           </a:p>
@@ -2931,7 +2931,7 @@
           <a:p>
             <a:fld id="{62E3D18E-7E1A-4440-A226-D2B0979B45F4}" type="datetimeFigureOut">
               <a:rPr lang="en-KE" smtClean="0"/>
-              <a:t>11/8/20</a:t>
+              <a:t>11/9/20</a:t>
             </a:fld>
             <a:endParaRPr lang="en-KE"/>
           </a:p>
@@ -3821,10 +3821,12 @@
             <a:avLst/>
           </a:prstGeom>
           <a:solidFill>
-            <a:srgbClr val="EED3F8"/>
+            <a:srgbClr val="E1EED8"/>
           </a:solidFill>
-          <a:ln w="28575">
-            <a:noFill/>
+          <a:ln w="50800">
+            <a:solidFill>
+              <a:srgbClr val="C5E0B4"/>
+            </a:solidFill>
           </a:ln>
         </p:spPr>
         <p:style>

</xml_diff>